<commit_message>
Edits to PP file
</commit_message>
<xml_diff>
--- a/Project Files/PDR_sec038team13.pptx
+++ b/Project Files/PDR_sec038team13.pptx
@@ -201,7 +201,7 @@
           <a:p>
             <a:fld id="{09263020-7307-B440-BADE-A21D76034005}" type="datetimeFigureOut">
               <a:rPr lang="en-US" smtClean="0"/>
-              <a:t>3/22/15</a:t>
+              <a:t>3/24/15</a:t>
             </a:fld>
             <a:endParaRPr lang="en-US"/>
           </a:p>
@@ -591,11 +591,6 @@
               </a:rPr>
               <a:t> model/simulation will do (one sentence preview)</a:t>
             </a:r>
-            <a:endParaRPr lang="en-US" dirty="0" smtClean="0">
-              <a:solidFill>
-                <a:srgbClr val="FF0000"/>
-              </a:solidFill>
-            </a:endParaRPr>
           </a:p>
         </p:txBody>
       </p:sp>
@@ -679,6 +674,90 @@
           <a:bodyPr/>
           <a:lstStyle/>
           <a:p>
+            <a:endParaRPr lang="en-US" dirty="0"/>
+          </a:p>
+        </p:txBody>
+      </p:sp>
+      <p:sp>
+        <p:nvSpPr>
+          <p:cNvPr id="4" name="Slide Number Placeholder 3"/>
+          <p:cNvSpPr>
+            <a:spLocks noGrp="1"/>
+          </p:cNvSpPr>
+          <p:nvPr>
+            <p:ph type="sldNum" sz="quarter" idx="10"/>
+          </p:nvPr>
+        </p:nvSpPr>
+        <p:spPr/>
+        <p:txBody>
+          <a:bodyPr/>
+          <a:lstStyle/>
+          <a:p>
+            <a:fld id="{3D49E353-9489-8E46-BF61-A0BD3FD2CE54}" type="slidenum">
+              <a:rPr lang="en-US" smtClean="0"/>
+              <a:t>4</a:t>
+            </a:fld>
+            <a:endParaRPr lang="en-US"/>
+          </a:p>
+        </p:txBody>
+      </p:sp>
+    </p:spTree>
+    <p:extLst>
+      <p:ext uri="{BB962C8B-B14F-4D97-AF65-F5344CB8AC3E}">
+        <p14:creationId xmlns:p14="http://schemas.microsoft.com/office/powerpoint/2010/main" val="2398738491"/>
+      </p:ext>
+    </p:extLst>
+  </p:cSld>
+  <p:clrMapOvr>
+    <a:masterClrMapping/>
+  </p:clrMapOvr>
+</p:notes>
+</file>
+
+<file path=ppt/notesSlides/notesSlide3.xml><?xml version="1.0" encoding="utf-8"?>
+<p:notes xmlns:a="http://schemas.openxmlformats.org/drawingml/2006/main" xmlns:r="http://schemas.openxmlformats.org/officeDocument/2006/relationships" xmlns:p="http://schemas.openxmlformats.org/presentationml/2006/main">
+  <p:cSld>
+    <p:spTree>
+      <p:nvGrpSpPr>
+        <p:cNvPr id="1" name=""/>
+        <p:cNvGrpSpPr/>
+        <p:nvPr/>
+      </p:nvGrpSpPr>
+      <p:grpSpPr>
+        <a:xfrm>
+          <a:off x="0" y="0"/>
+          <a:ext cx="0" cy="0"/>
+          <a:chOff x="0" y="0"/>
+          <a:chExt cx="0" cy="0"/>
+        </a:xfrm>
+      </p:grpSpPr>
+      <p:sp>
+        <p:nvSpPr>
+          <p:cNvPr id="2" name="Slide Image Placeholder 1"/>
+          <p:cNvSpPr>
+            <a:spLocks noGrp="1" noRot="1" noChangeAspect="1"/>
+          </p:cNvSpPr>
+          <p:nvPr>
+            <p:ph type="sldImg"/>
+          </p:nvPr>
+        </p:nvSpPr>
+        <p:spPr/>
+      </p:sp>
+      <p:sp>
+        <p:nvSpPr>
+          <p:cNvPr id="3" name="Notes Placeholder 2"/>
+          <p:cNvSpPr>
+            <a:spLocks noGrp="1"/>
+          </p:cNvSpPr>
+          <p:nvPr>
+            <p:ph type="body" idx="1"/>
+          </p:nvPr>
+        </p:nvSpPr>
+        <p:spPr/>
+        <p:txBody>
+          <a:bodyPr/>
+          <a:lstStyle/>
+          <a:p>
             <a:r>
               <a:rPr lang="en-US" dirty="0" smtClean="0"/>
               <a:t>A:</a:t>
@@ -826,7 +905,7 @@
 </p:notes>
 </file>
 
-<file path=ppt/notesSlides/notesSlide3.xml><?xml version="1.0" encoding="utf-8"?>
+<file path=ppt/notesSlides/notesSlide4.xml><?xml version="1.0" encoding="utf-8"?>
 <p:notes xmlns:a="http://schemas.openxmlformats.org/drawingml/2006/main" xmlns:r="http://schemas.openxmlformats.org/officeDocument/2006/relationships" xmlns:p="http://schemas.openxmlformats.org/presentationml/2006/main">
   <p:cSld>
     <p:spTree>
@@ -1560,7 +1639,7 @@
           <a:p>
             <a:fld id="{D5688612-FEC6-47BA-91DF-33F44ABAEDA3}" type="datetimeFigureOut">
               <a:rPr lang="en-US" smtClean="0"/>
-              <a:t>3/22/15</a:t>
+              <a:t>3/24/15</a:t>
             </a:fld>
             <a:endParaRPr lang="en-US"/>
           </a:p>
@@ -1850,7 +1929,7 @@
           <a:p>
             <a:fld id="{D5688612-FEC6-47BA-91DF-33F44ABAEDA3}" type="datetimeFigureOut">
               <a:rPr lang="en-US" smtClean="0"/>
-              <a:t>3/22/15</a:t>
+              <a:t>3/24/15</a:t>
             </a:fld>
             <a:endParaRPr lang="en-US"/>
           </a:p>
@@ -2154,7 +2233,7 @@
           <a:p>
             <a:fld id="{D5688612-FEC6-47BA-91DF-33F44ABAEDA3}" type="datetimeFigureOut">
               <a:rPr lang="en-US" smtClean="0"/>
-              <a:t>3/22/15</a:t>
+              <a:t>3/24/15</a:t>
             </a:fld>
             <a:endParaRPr lang="en-US"/>
           </a:p>
@@ -2419,7 +2498,7 @@
           <a:p>
             <a:fld id="{D5688612-FEC6-47BA-91DF-33F44ABAEDA3}" type="datetimeFigureOut">
               <a:rPr lang="en-US" smtClean="0"/>
-              <a:t>3/22/15</a:t>
+              <a:t>3/24/15</a:t>
             </a:fld>
             <a:endParaRPr lang="en-US"/>
           </a:p>
@@ -2669,7 +2748,7 @@
           <a:p>
             <a:fld id="{0D91CF6C-4A99-47F9-835F-1B74452D2D0E}" type="datetimeFigureOut">
               <a:rPr lang="en-US" smtClean="0"/>
-              <a:t>3/22/15</a:t>
+              <a:t>3/24/15</a:t>
             </a:fld>
             <a:endParaRPr lang="en-US"/>
           </a:p>
@@ -2839,7 +2918,7 @@
           <a:p>
             <a:fld id="{D5688612-FEC6-47BA-91DF-33F44ABAEDA3}" type="datetimeFigureOut">
               <a:rPr lang="en-US" smtClean="0"/>
-              <a:t>3/22/15</a:t>
+              <a:t>3/24/15</a:t>
             </a:fld>
             <a:endParaRPr lang="en-US"/>
           </a:p>
@@ -3085,7 +3164,7 @@
           <a:p>
             <a:fld id="{0D91CF6C-4A99-47F9-835F-1B74452D2D0E}" type="datetimeFigureOut">
               <a:rPr lang="en-US" smtClean="0"/>
-              <a:t>3/22/15</a:t>
+              <a:t>3/24/15</a:t>
             </a:fld>
             <a:endParaRPr lang="en-US"/>
           </a:p>
@@ -3373,7 +3452,7 @@
           <a:p>
             <a:fld id="{0D91CF6C-4A99-47F9-835F-1B74452D2D0E}" type="datetimeFigureOut">
               <a:rPr lang="en-US" smtClean="0"/>
-              <a:t>3/22/15</a:t>
+              <a:t>3/24/15</a:t>
             </a:fld>
             <a:endParaRPr lang="en-US"/>
           </a:p>
@@ -3795,7 +3874,7 @@
           <a:p>
             <a:fld id="{0D91CF6C-4A99-47F9-835F-1B74452D2D0E}" type="datetimeFigureOut">
               <a:rPr lang="en-US" smtClean="0"/>
-              <a:t>3/22/15</a:t>
+              <a:t>3/24/15</a:t>
             </a:fld>
             <a:endParaRPr lang="en-US"/>
           </a:p>
@@ -3913,7 +3992,7 @@
           <a:p>
             <a:fld id="{D5688612-FEC6-47BA-91DF-33F44ABAEDA3}" type="datetimeFigureOut">
               <a:rPr lang="en-US" smtClean="0"/>
-              <a:t>3/22/15</a:t>
+              <a:t>3/24/15</a:t>
             </a:fld>
             <a:endParaRPr lang="en-US"/>
           </a:p>
@@ -4008,7 +4087,7 @@
           <a:p>
             <a:fld id="{0D91CF6C-4A99-47F9-835F-1B74452D2D0E}" type="datetimeFigureOut">
               <a:rPr lang="en-US" smtClean="0"/>
-              <a:t>3/22/15</a:t>
+              <a:t>3/24/15</a:t>
             </a:fld>
             <a:endParaRPr lang="en-US"/>
           </a:p>
@@ -4907,7 +4986,7 @@
           <a:p>
             <a:fld id="{0D91CF6C-4A99-47F9-835F-1B74452D2D0E}" type="datetimeFigureOut">
               <a:rPr lang="en-US" smtClean="0"/>
-              <a:t>3/22/15</a:t>
+              <a:t>3/24/15</a:t>
             </a:fld>
             <a:endParaRPr lang="en-US"/>
           </a:p>
@@ -5160,7 +5239,7 @@
           <a:p>
             <a:fld id="{0D91CF6C-4A99-47F9-835F-1B74452D2D0E}" type="datetimeFigureOut">
               <a:rPr lang="en-US" smtClean="0"/>
-              <a:t>3/22/15</a:t>
+              <a:t>3/24/15</a:t>
             </a:fld>
             <a:endParaRPr lang="en-US"/>
           </a:p>
@@ -5330,7 +5409,7 @@
           <a:p>
             <a:fld id="{0D91CF6C-4A99-47F9-835F-1B74452D2D0E}" type="datetimeFigureOut">
               <a:rPr lang="en-US" smtClean="0"/>
-              <a:t>3/22/15</a:t>
+              <a:t>3/24/15</a:t>
             </a:fld>
             <a:endParaRPr lang="en-US"/>
           </a:p>
@@ -5510,7 +5589,7 @@
           <a:p>
             <a:fld id="{0D91CF6C-4A99-47F9-835F-1B74452D2D0E}" type="datetimeFigureOut">
               <a:rPr lang="en-US" smtClean="0"/>
-              <a:t>3/22/15</a:t>
+              <a:t>3/24/15</a:t>
             </a:fld>
             <a:endParaRPr lang="en-US"/>
           </a:p>
@@ -7343,7 +7422,7 @@
           <a:p>
             <a:fld id="{D5688612-FEC6-47BA-91DF-33F44ABAEDA3}" type="datetimeFigureOut">
               <a:rPr lang="en-US" smtClean="0"/>
-              <a:t>3/22/15</a:t>
+              <a:t>3/24/15</a:t>
             </a:fld>
             <a:endParaRPr lang="en-US"/>
           </a:p>
@@ -8128,7 +8207,7 @@
           <a:p>
             <a:fld id="{0D91CF6C-4A99-47F9-835F-1B74452D2D0E}" type="datetimeFigureOut">
               <a:rPr lang="en-US" smtClean="0"/>
-              <a:t>3/22/15</a:t>
+              <a:t>3/24/15</a:t>
             </a:fld>
             <a:endParaRPr lang="en-US"/>
           </a:p>
@@ -8598,72 +8677,6 @@
           </a:p>
         </p:txBody>
       </p:sp>
-      <p:sp>
-        <p:nvSpPr>
-          <p:cNvPr id="4" name="Rectangle 3"/>
-          <p:cNvSpPr/>
-          <p:nvPr/>
-        </p:nvSpPr>
-        <p:spPr>
-          <a:xfrm>
-            <a:off x="5410200" y="5562600"/>
-            <a:ext cx="3124200" cy="990600"/>
-          </a:xfrm>
-          <a:prstGeom prst="rect">
-            <a:avLst/>
-          </a:prstGeom>
-        </p:spPr>
-        <p:style>
-          <a:lnRef idx="1">
-            <a:schemeClr val="accent1"/>
-          </a:lnRef>
-          <a:fillRef idx="3">
-            <a:schemeClr val="accent1"/>
-          </a:fillRef>
-          <a:effectRef idx="2">
-            <a:schemeClr val="accent1"/>
-          </a:effectRef>
-          <a:fontRef idx="minor">
-            <a:schemeClr val="lt1"/>
-          </a:fontRef>
-        </p:style>
-        <p:txBody>
-          <a:bodyPr rtlCol="0" anchor="ctr"/>
-          <a:lstStyle/>
-          <a:p>
-            <a:pPr algn="ctr"/>
-            <a:r>
-              <a:rPr lang="en-US" dirty="0" smtClean="0">
-                <a:solidFill>
-                  <a:srgbClr val="C00000"/>
-                </a:solidFill>
-              </a:rPr>
-              <a:t>Spend less than </a:t>
-            </a:r>
-            <a:r>
-              <a:rPr lang="en-US" dirty="0" smtClean="0">
-                <a:solidFill>
-                  <a:srgbClr val="FFFF00"/>
-                </a:solidFill>
-              </a:rPr>
-              <a:t>30 seconds</a:t>
-            </a:r>
-            <a:r>
-              <a:rPr lang="en-US" dirty="0" smtClean="0">
-                <a:solidFill>
-                  <a:srgbClr val="C00000"/>
-                </a:solidFill>
-              </a:rPr>
-              <a:t> on this slide</a:t>
-            </a:r>
-            <a:endParaRPr lang="en-US" dirty="0">
-              <a:solidFill>
-                <a:srgbClr val="C00000"/>
-              </a:solidFill>
-            </a:endParaRPr>
-          </a:p>
-        </p:txBody>
-      </p:sp>
     </p:spTree>
     <p:extLst>
       <p:ext uri="{BB962C8B-B14F-4D97-AF65-F5344CB8AC3E}">
@@ -8711,7 +8724,12 @@
             <p:ph type="title"/>
           </p:nvPr>
         </p:nvSpPr>
-        <p:spPr/>
+        <p:spPr>
+          <a:xfrm>
+            <a:off x="381000" y="152400"/>
+            <a:ext cx="8326020" cy="748782"/>
+          </a:xfrm>
+        </p:spPr>
         <p:txBody>
           <a:bodyPr/>
           <a:lstStyle/>
@@ -8753,11 +8771,7 @@
           <a:p>
             <a:r>
               <a:rPr lang="en-US" dirty="0" smtClean="0"/>
-              <a:t>We have been asked to create </a:t>
-            </a:r>
-            <a:r>
-              <a:rPr lang="en-US" dirty="0" smtClean="0"/>
-              <a:t>a simulation that visualizes Quantum Dot applications, specifically towards energy output and absorption.</a:t>
+              <a:t>We have been asked to create a simulation that visualizes Quantum Dot applications, specifically towards energy output and absorption.</a:t>
             </a:r>
           </a:p>
           <a:p>
@@ -8774,33 +8788,17 @@
                   <a:srgbClr val="000000"/>
                 </a:solidFill>
               </a:rPr>
-              <a:t>Our </a:t>
-            </a:r>
+              <a:t>Our direct user will be a Quantum Dot Photo Voltaic solar cell fabrication lab.</a:t>
+            </a:r>
+          </a:p>
+          <a:p>
             <a:r>
               <a:rPr lang="en-US" dirty="0" smtClean="0">
                 <a:solidFill>
                   <a:srgbClr val="000000"/>
                 </a:solidFill>
               </a:rPr>
-              <a:t>direct user will be a Quantum Dot Photo Voltaic solar cell fabrication lab.</a:t>
-            </a:r>
-          </a:p>
-          <a:p>
-            <a:r>
-              <a:rPr lang="en-US" dirty="0" smtClean="0">
-                <a:solidFill>
-                  <a:srgbClr val="000000"/>
-                </a:solidFill>
-              </a:rPr>
-              <a:t>1</a:t>
-            </a:r>
-            <a:r>
-              <a:rPr lang="en-US" dirty="0" smtClean="0">
-                <a:solidFill>
-                  <a:srgbClr val="000000"/>
-                </a:solidFill>
-              </a:rPr>
-              <a:t>: Calculate and graph efficiencies of Cost/Toxicity (or both) against materials.</a:t>
+              <a:t>1: Calculate and graph efficiencies of Cost/Toxicity (or both) against materials.</a:t>
             </a:r>
           </a:p>
           <a:p>
@@ -8973,152 +8971,6 @@
       </p:grpSpPr>
       <p:sp>
         <p:nvSpPr>
-          <p:cNvPr id="2" name="Title 1"/>
-          <p:cNvSpPr>
-            <a:spLocks noGrp="1"/>
-          </p:cNvSpPr>
-          <p:nvPr>
-            <p:ph type="title"/>
-          </p:nvPr>
-        </p:nvSpPr>
-        <p:spPr/>
-        <p:txBody>
-          <a:bodyPr/>
-          <a:lstStyle/>
-          <a:p>
-            <a:r>
-              <a:rPr lang="en-US" dirty="0" smtClean="0"/>
-              <a:t>Navigation Map</a:t>
-            </a:r>
-            <a:endParaRPr lang="en-US" dirty="0"/>
-          </a:p>
-        </p:txBody>
-      </p:sp>
-      <p:sp>
-        <p:nvSpPr>
-          <p:cNvPr id="4" name="Text Placeholder 3"/>
-          <p:cNvSpPr>
-            <a:spLocks noGrp="1"/>
-          </p:cNvSpPr>
-          <p:nvPr>
-            <p:ph type="body" idx="12"/>
-          </p:nvPr>
-        </p:nvSpPr>
-        <p:spPr/>
-        <p:txBody>
-          <a:bodyPr/>
-          <a:lstStyle/>
-          <a:p>
-            <a:r>
-              <a:rPr lang="en-US" dirty="0" smtClean="0">
-                <a:solidFill>
-                  <a:srgbClr val="FF0000"/>
-                </a:solidFill>
-              </a:rPr>
-              <a:t>Copy your M4 Navigation Map </a:t>
-            </a:r>
-            <a:r>
-              <a:rPr lang="en-US" dirty="0" smtClean="0">
-                <a:solidFill>
-                  <a:schemeClr val="accent5">
-                    <a:lumMod val="75000"/>
-                  </a:schemeClr>
-                </a:solidFill>
-              </a:rPr>
-              <a:t>here</a:t>
-            </a:r>
-          </a:p>
-          <a:p>
-            <a:endParaRPr lang="en-US" dirty="0">
-              <a:solidFill>
-                <a:srgbClr val="FF0000"/>
-              </a:solidFill>
-            </a:endParaRPr>
-          </a:p>
-          <a:p>
-            <a:r>
-              <a:rPr lang="en-US" dirty="0" smtClean="0">
-                <a:solidFill>
-                  <a:srgbClr val="FF0000"/>
-                </a:solidFill>
-              </a:rPr>
-              <a:t>Discuss for each GUI screen:</a:t>
-            </a:r>
-          </a:p>
-          <a:p>
-            <a:pPr marL="174625" indent="-174625">
-              <a:buFont typeface="Arial" panose="020B0604020202020204" pitchFamily="34" charset="0"/>
-              <a:buChar char="•"/>
-            </a:pPr>
-            <a:r>
-              <a:rPr lang="en-US" dirty="0" smtClean="0">
-                <a:solidFill>
-                  <a:srgbClr val="FF0000"/>
-                </a:solidFill>
-              </a:rPr>
-              <a:t>Programmatic inputs/outputs</a:t>
-            </a:r>
-          </a:p>
-          <a:p>
-            <a:pPr marL="174625" indent="-174625">
-              <a:buFont typeface="Arial" panose="020B0604020202020204" pitchFamily="34" charset="0"/>
-              <a:buChar char="•"/>
-            </a:pPr>
-            <a:r>
-              <a:rPr lang="en-US" dirty="0" smtClean="0">
-                <a:solidFill>
-                  <a:srgbClr val="FF0000"/>
-                </a:solidFill>
-              </a:rPr>
-              <a:t>User inputs/outputs</a:t>
-            </a:r>
-          </a:p>
-          <a:p>
-            <a:pPr marL="174625" indent="-174625">
-              <a:buFont typeface="Arial" panose="020B0604020202020204" pitchFamily="34" charset="0"/>
-              <a:buChar char="•"/>
-            </a:pPr>
-            <a:r>
-              <a:rPr lang="en-US" dirty="0" smtClean="0">
-                <a:solidFill>
-                  <a:schemeClr val="accent5">
-                    <a:lumMod val="75000"/>
-                  </a:schemeClr>
-                </a:solidFill>
-              </a:rPr>
-              <a:t>Each teammate describe</a:t>
-            </a:r>
-            <a:r>
-              <a:rPr lang="en-US" dirty="0" smtClean="0">
-                <a:solidFill>
-                  <a:srgbClr val="FF0000"/>
-                </a:solidFill>
-              </a:rPr>
-              <a:t> what </a:t>
-            </a:r>
-            <a:r>
-              <a:rPr lang="en-US" dirty="0" smtClean="0">
-                <a:solidFill>
-                  <a:schemeClr val="accent5">
-                    <a:lumMod val="75000"/>
-                  </a:schemeClr>
-                </a:solidFill>
-              </a:rPr>
-              <a:t>his/her</a:t>
-            </a:r>
-            <a:r>
-              <a:rPr lang="en-US" dirty="0" smtClean="0">
-                <a:solidFill>
-                  <a:srgbClr val="FF0000"/>
-                </a:solidFill>
-              </a:rPr>
-              <a:t> model/simulation will do (one sentence preview)</a:t>
-            </a:r>
-          </a:p>
-        </p:txBody>
-      </p:sp>
-      <p:sp>
-        <p:nvSpPr>
           <p:cNvPr id="5" name="Rectangle 4"/>
           <p:cNvSpPr/>
           <p:nvPr/>
@@ -9325,6 +9177,36 @@
           </a:p>
         </p:txBody>
       </p:sp>
+      <p:pic>
+        <p:nvPicPr>
+          <p:cNvPr id="7" name="Picture 6" descr="Screen Shot 2015-03-24 at 9.08.18 AM.png"/>
+          <p:cNvPicPr>
+            <a:picLocks noChangeAspect="1"/>
+          </p:cNvPicPr>
+          <p:nvPr/>
+        </p:nvPicPr>
+        <p:blipFill>
+          <a:blip r:embed="rId8">
+            <a:extLst>
+              <a:ext uri="{28A0092B-C50C-407E-A947-70E740481C1C}">
+                <a14:useLocalDpi xmlns:a14="http://schemas.microsoft.com/office/drawing/2010/main" val="0"/>
+              </a:ext>
+            </a:extLst>
+          </a:blip>
+          <a:stretch>
+            <a:fillRect/>
+          </a:stretch>
+        </p:blipFill>
+        <p:spPr>
+          <a:xfrm>
+            <a:off x="0" y="5791200"/>
+            <a:ext cx="2171700" cy="1066800"/>
+          </a:xfrm>
+          <a:prstGeom prst="rect">
+            <a:avLst/>
+          </a:prstGeom>
+        </p:spPr>
+      </p:pic>
     </p:spTree>
     <p:extLst>
       <p:ext uri="{BB962C8B-B14F-4D97-AF65-F5344CB8AC3E}">
@@ -9536,6 +9418,36 @@
           </a:p>
         </p:txBody>
       </p:sp>
+      <p:pic>
+        <p:nvPicPr>
+          <p:cNvPr id="3" name="Picture 2" descr="Screen Shot 2015-03-24 at 9.02.58 AM.png"/>
+          <p:cNvPicPr>
+            <a:picLocks noChangeAspect="1"/>
+          </p:cNvPicPr>
+          <p:nvPr/>
+        </p:nvPicPr>
+        <p:blipFill>
+          <a:blip r:embed="rId3" cstate="print">
+            <a:extLst>
+              <a:ext uri="{28A0092B-C50C-407E-A947-70E740481C1C}">
+                <a14:useLocalDpi xmlns:a14="http://schemas.microsoft.com/office/drawing/2010/main" val="0"/>
+              </a:ext>
+            </a:extLst>
+          </a:blip>
+          <a:stretch>
+            <a:fillRect/>
+          </a:stretch>
+        </p:blipFill>
+        <p:spPr>
+          <a:xfrm>
+            <a:off x="0" y="154033"/>
+            <a:ext cx="9144000" cy="5789568"/>
+          </a:xfrm>
+          <a:prstGeom prst="rect">
+            <a:avLst/>
+          </a:prstGeom>
+        </p:spPr>
+      </p:pic>
     </p:spTree>
     <p:extLst>
       <p:ext uri="{BB962C8B-B14F-4D97-AF65-F5344CB8AC3E}">
@@ -10251,7 +10163,7 @@
           <a:graphicData uri="http://schemas.openxmlformats.org/presentationml/2006/ole">
             <mc:AlternateContent xmlns:mc="http://schemas.openxmlformats.org/markup-compatibility/2006">
               <mc:Choice xmlns:v="urn:schemas-microsoft-com:vml" Requires="v">
-                <p:oleObj spid="_x0000_s1030" name="Equation" r:id="rId5" imgW="114300" imgH="165100" progId="Equation.3">
+                <p:oleObj spid="_x0000_s1032" name="Equation" r:id="rId5" imgW="114300" imgH="165100" progId="Equation.3">
                   <p:embed/>
                 </p:oleObj>
               </mc:Choice>
@@ -10361,14 +10273,6 @@
           <a:bodyPr/>
           <a:lstStyle/>
           <a:p>
-            <a:r>
-              <a:rPr lang="en-US" dirty="0" smtClean="0">
-                <a:solidFill>
-                  <a:srgbClr val="FF0000"/>
-                </a:solidFill>
-              </a:rPr>
-              <a:t>No Citations Used</a:t>
-            </a:r>
             <a:endParaRPr lang="en-US" dirty="0">
               <a:solidFill>
                 <a:srgbClr val="FF0000"/>
@@ -10377,6 +10281,36 @@
           </a:p>
         </p:txBody>
       </p:sp>
+      <p:pic>
+        <p:nvPicPr>
+          <p:cNvPr id="6" name="Picture 5" descr="Screen Shot 2015-03-24 at 9.05.54 AM.png"/>
+          <p:cNvPicPr>
+            <a:picLocks noChangeAspect="1"/>
+          </p:cNvPicPr>
+          <p:nvPr/>
+        </p:nvPicPr>
+        <p:blipFill>
+          <a:blip r:embed="rId2">
+            <a:extLst>
+              <a:ext uri="{28A0092B-C50C-407E-A947-70E740481C1C}">
+                <a14:useLocalDpi xmlns:a14="http://schemas.microsoft.com/office/drawing/2010/main" val="0"/>
+              </a:ext>
+            </a:extLst>
+          </a:blip>
+          <a:stretch>
+            <a:fillRect/>
+          </a:stretch>
+        </p:blipFill>
+        <p:spPr>
+          <a:xfrm>
+            <a:off x="23384" y="925428"/>
+            <a:ext cx="9078799" cy="5018172"/>
+          </a:xfrm>
+          <a:prstGeom prst="rect">
+            <a:avLst/>
+          </a:prstGeom>
+        </p:spPr>
+      </p:pic>
     </p:spTree>
     <p:extLst>
       <p:ext uri="{BB962C8B-B14F-4D97-AF65-F5344CB8AC3E}">

</xml_diff>

<commit_message>
Added Rashid's slide and description.
</commit_message>
<xml_diff>
--- a/Project Files/PDR_sec038team13.pptx
+++ b/Project Files/PDR_sec038team13.pptx
@@ -674,6 +674,117 @@
           <a:bodyPr/>
           <a:lstStyle/>
           <a:p>
+            <a:r>
+              <a:rPr lang="en-US" dirty="0" smtClean="0"/>
+              <a:t>A: Inputs</a:t>
+            </a:r>
+            <a:r>
+              <a:rPr lang="en-US" baseline="0" dirty="0" smtClean="0"/>
+              <a:t>: Materials’ size, cost and toxicity, and desired absorptivity.</a:t>
+            </a:r>
+          </a:p>
+          <a:p>
+            <a:r>
+              <a:rPr lang="en-US" baseline="0" dirty="0" smtClean="0"/>
+              <a:t>Outputs: Two plots, one of cost/efficiency graph, one of the relative efficiency of the individual materials in a bar graph.</a:t>
+            </a:r>
+          </a:p>
+          <a:p>
+            <a:r>
+              <a:rPr lang="en-US" baseline="0" dirty="0" smtClean="0"/>
+              <a:t>Other actions: The users can also select individual materials to graph.</a:t>
+            </a:r>
+          </a:p>
+          <a:p>
+            <a:pPr marL="0" marR="0" indent="0" algn="l" defTabSz="457200" rtl="0" eaLnBrk="1" fontAlgn="auto" latinLnBrk="0" hangingPunct="1">
+              <a:lnSpc>
+                <a:spcPct val="100000"/>
+              </a:lnSpc>
+              <a:spcBef>
+                <a:spcPts val="0"/>
+              </a:spcBef>
+              <a:spcAft>
+                <a:spcPts val="0"/>
+              </a:spcAft>
+              <a:buClrTx/>
+              <a:buSzTx/>
+              <a:buFontTx/>
+              <a:buNone/>
+              <a:tabLst/>
+              <a:defRPr/>
+            </a:pPr>
+            <a:r>
+              <a:rPr lang="en-US" baseline="0" dirty="0" smtClean="0"/>
+              <a:t>B: We plan to use this equation to calculate band gap energy. </a:t>
+            </a:r>
+            <a:r>
+              <a:rPr lang="en-US" dirty="0" err="1" smtClean="0"/>
+              <a:t>Eg</a:t>
+            </a:r>
+            <a:r>
+              <a:rPr lang="en-US" dirty="0" smtClean="0"/>
+              <a:t>(</a:t>
+            </a:r>
+            <a:r>
+              <a:rPr lang="en-US" dirty="0" err="1" smtClean="0"/>
+              <a:t>Qdot</a:t>
+            </a:r>
+            <a:r>
+              <a:rPr lang="en-US" dirty="0" smtClean="0"/>
+              <a:t>)</a:t>
+            </a:r>
+            <a:r>
+              <a:rPr lang="en-US" baseline="0" dirty="0" smtClean="0"/>
+              <a:t> = </a:t>
+            </a:r>
+            <a:r>
+              <a:rPr lang="en-US" baseline="0" dirty="0" err="1" smtClean="0"/>
+              <a:t>Eg</a:t>
+            </a:r>
+            <a:r>
+              <a:rPr lang="en-US" baseline="0" dirty="0" smtClean="0"/>
+              <a:t>(bulk) + (h^2/4mer^2) – (1.8e^2/4pi(epsilon)(epsilon0)r). </a:t>
+            </a:r>
+          </a:p>
+          <a:p>
+            <a:r>
+              <a:rPr lang="en-US" dirty="0" smtClean="0"/>
+              <a:t>We</a:t>
+            </a:r>
+            <a:r>
+              <a:rPr lang="en-US" baseline="0" dirty="0" smtClean="0"/>
+              <a:t> will also use basic efficiency mathematics to determine the efficiency. We will also use our mathematical model to minimize the cost and toxicity in the selection of the materials as it pertains to the simulation.</a:t>
+            </a:r>
+          </a:p>
+          <a:p>
+            <a:r>
+              <a:rPr lang="en-US" baseline="0" dirty="0" smtClean="0"/>
+              <a:t>C: Each input field will have a check to make sure that the user has input a valid quantity. Also that there is a selection made in each  mandatory field.</a:t>
+            </a:r>
+          </a:p>
+          <a:p>
+            <a:r>
+              <a:rPr lang="en-US" baseline="0" dirty="0" smtClean="0"/>
+              <a:t>D: There will be pop-up instructions for each field that does not have an informative string available.</a:t>
+            </a:r>
+          </a:p>
+          <a:p>
+            <a:r>
+              <a:rPr lang="en-US" baseline="0" dirty="0" smtClean="0"/>
+              <a:t>E: Rashid </a:t>
+            </a:r>
+            <a:r>
+              <a:rPr lang="en-US" baseline="0" dirty="0" err="1" smtClean="0"/>
+              <a:t>Sarwar</a:t>
+            </a:r>
+            <a:r>
+              <a:rPr lang="en-US" baseline="0" dirty="0" smtClean="0"/>
+              <a:t> will </a:t>
+            </a:r>
+            <a:r>
+              <a:rPr lang="en-US" baseline="0" smtClean="0"/>
+              <a:t>program this GUI.</a:t>
+            </a:r>
             <a:endParaRPr lang="en-US" dirty="0"/>
           </a:p>
         </p:txBody>
@@ -853,13 +964,8 @@
             </a:r>
             <a:r>
               <a:rPr lang="en-US" baseline="0" dirty="0" smtClean="0"/>
-              <a:t> Shah will be responsible for </a:t>
-            </a:r>
-            <a:r>
-              <a:rPr lang="en-US" baseline="0" smtClean="0"/>
-              <a:t>coding this GUI.</a:t>
-            </a:r>
-            <a:endParaRPr lang="en-US" baseline="0" dirty="0" smtClean="0"/>
+              <a:t> Shah will be responsible for coding this GUI.</a:t>
+            </a:r>
           </a:p>
           <a:p>
             <a:endParaRPr lang="en-US" baseline="0" dirty="0" smtClean="0"/>
@@ -10163,7 +10269,7 @@
           <a:graphicData uri="http://schemas.openxmlformats.org/presentationml/2006/ole">
             <mc:AlternateContent xmlns:mc="http://schemas.openxmlformats.org/markup-compatibility/2006">
               <mc:Choice xmlns:v="urn:schemas-microsoft-com:vml" Requires="v">
-                <p:oleObj spid="_x0000_s1032" name="Equation" r:id="rId5" imgW="114300" imgH="165100" progId="Equation.3">
+                <p:oleObj spid="_x0000_s1033" name="Equation" r:id="rId5" imgW="114300" imgH="165100" progId="Equation.3">
                   <p:embed/>
                 </p:oleObj>
               </mc:Choice>

</xml_diff>

<commit_message>
Redid the redoing of the ppt
</commit_message>
<xml_diff>
--- a/Project Files/PDR_sec038team13.pptx
+++ b/Project Files/PDR_sec038team13.pptx
@@ -13,7 +13,7 @@
     <p:sldId id="257" r:id="rId4"/>
     <p:sldId id="259" r:id="rId5"/>
     <p:sldId id="264" r:id="rId6"/>
-    <p:sldId id="265" r:id="rId7"/>
+    <p:sldId id="267" r:id="rId7"/>
     <p:sldId id="266" r:id="rId8"/>
     <p:sldId id="260" r:id="rId9"/>
     <p:sldId id="261" r:id="rId10"/>
@@ -116,6 +116,22 @@
       </a:defRPr>
     </a:lvl9pPr>
   </p:defaultTextStyle>
+  <p:extLst>
+    <p:ext uri="{EFAFB233-063F-42B5-8137-9DF3F51BA10A}">
+      <p15:sldGuideLst xmlns:p15="http://schemas.microsoft.com/office/powerpoint/2012/main">
+        <p15:guide id="1" orient="horz" pos="2160">
+          <p15:clr>
+            <a:srgbClr val="A4A3A4"/>
+          </p15:clr>
+        </p15:guide>
+        <p15:guide id="2" pos="2880">
+          <p15:clr>
+            <a:srgbClr val="A4A3A4"/>
+          </p15:clr>
+        </p15:guide>
+      </p15:sldGuideLst>
+    </p:ext>
+  </p:extLst>
 </p:presentation>
 </file>
 
@@ -201,7 +217,7 @@
           <a:p>
             <a:fld id="{09263020-7307-B440-BADE-A21D76034005}" type="datetimeFigureOut">
               <a:rPr lang="en-US" smtClean="0"/>
-              <a:t>3/24/15</a:t>
+              <a:t>3/24/2015</a:t>
             </a:fld>
             <a:endParaRPr lang="en-US"/>
           </a:p>
@@ -871,6 +887,129 @@
           <a:p>
             <a:r>
               <a:rPr lang="en-US" dirty="0" smtClean="0"/>
+              <a:t>A: User will input which material</a:t>
+            </a:r>
+            <a:r>
+              <a:rPr lang="en-US" baseline="0" dirty="0" smtClean="0"/>
+              <a:t> (by number) are available for the purposes of the simulation. The user will also the target band gap energy. The user will use a slider to select the relative importance of cost/toxicity. The user will also select a “step size” indicating the increments used in the generation of the graph. A graph will be generated based on user selection of axis properties. These may include concentration of one of the materials, cost, or toxicity; a none option will also be provided for the z-axis. The user will be able to see how the given properties relate with regards to a particular configuration, e.g. how cost and toxicity vary with concentration of a particular element.</a:t>
+            </a:r>
+          </a:p>
+          <a:p>
+            <a:r>
+              <a:rPr lang="en-US" baseline="0" dirty="0" smtClean="0"/>
+              <a:t>B: The </a:t>
+            </a:r>
+            <a:r>
+              <a:rPr lang="en-US" baseline="0" dirty="0" err="1" smtClean="0"/>
+              <a:t>gui</a:t>
+            </a:r>
+            <a:r>
+              <a:rPr lang="en-US" baseline="0" dirty="0" smtClean="0"/>
+              <a:t> uses a similar mathematical model to the one in the modeling sets earlier in this course. It allows the variation (forcing a required usage in a desired quantity) of up to two materials in the optimization. It is being forced as such and then plots accordingly. </a:t>
+            </a:r>
+          </a:p>
+          <a:p>
+            <a:r>
+              <a:rPr lang="en-US" baseline="0" dirty="0" smtClean="0"/>
+              <a:t>C: the only error checking required is ensuring the materials list is appropriate.</a:t>
+            </a:r>
+          </a:p>
+          <a:p>
+            <a:r>
+              <a:rPr lang="en-US" baseline="0" dirty="0" smtClean="0"/>
+              <a:t>D; Help documentation is provided by the help button.</a:t>
+            </a:r>
+          </a:p>
+          <a:p>
+            <a:r>
+              <a:rPr lang="en-US" baseline="0" dirty="0" smtClean="0"/>
+              <a:t>E: Apoorva Kharche</a:t>
+            </a:r>
+          </a:p>
+        </p:txBody>
+      </p:sp>
+      <p:sp>
+        <p:nvSpPr>
+          <p:cNvPr id="4" name="Slide Number Placeholder 3"/>
+          <p:cNvSpPr>
+            <a:spLocks noGrp="1"/>
+          </p:cNvSpPr>
+          <p:nvPr>
+            <p:ph type="sldNum" sz="quarter" idx="10"/>
+          </p:nvPr>
+        </p:nvSpPr>
+        <p:spPr/>
+        <p:txBody>
+          <a:bodyPr/>
+          <a:lstStyle/>
+          <a:p>
+            <a:fld id="{3D49E353-9489-8E46-BF61-A0BD3FD2CE54}" type="slidenum">
+              <a:rPr lang="en-US" smtClean="0"/>
+              <a:t>5</a:t>
+            </a:fld>
+            <a:endParaRPr lang="en-US"/>
+          </a:p>
+        </p:txBody>
+      </p:sp>
+    </p:spTree>
+    <p:extLst>
+      <p:ext uri="{BB962C8B-B14F-4D97-AF65-F5344CB8AC3E}">
+        <p14:creationId xmlns:p14="http://schemas.microsoft.com/office/powerpoint/2010/main" val="3978328441"/>
+      </p:ext>
+    </p:extLst>
+  </p:cSld>
+  <p:clrMapOvr>
+    <a:masterClrMapping/>
+  </p:clrMapOvr>
+</p:notes>
+</file>
+
+<file path=ppt/notesSlides/notesSlide4.xml><?xml version="1.0" encoding="utf-8"?>
+<p:notes xmlns:a="http://schemas.openxmlformats.org/drawingml/2006/main" xmlns:r="http://schemas.openxmlformats.org/officeDocument/2006/relationships" xmlns:p="http://schemas.openxmlformats.org/presentationml/2006/main">
+  <p:cSld>
+    <p:spTree>
+      <p:nvGrpSpPr>
+        <p:cNvPr id="1" name=""/>
+        <p:cNvGrpSpPr/>
+        <p:nvPr/>
+      </p:nvGrpSpPr>
+      <p:grpSpPr>
+        <a:xfrm>
+          <a:off x="0" y="0"/>
+          <a:ext cx="0" cy="0"/>
+          <a:chOff x="0" y="0"/>
+          <a:chExt cx="0" cy="0"/>
+        </a:xfrm>
+      </p:grpSpPr>
+      <p:sp>
+        <p:nvSpPr>
+          <p:cNvPr id="2" name="Slide Image Placeholder 1"/>
+          <p:cNvSpPr>
+            <a:spLocks noGrp="1" noRot="1" noChangeAspect="1"/>
+          </p:cNvSpPr>
+          <p:nvPr>
+            <p:ph type="sldImg"/>
+          </p:nvPr>
+        </p:nvSpPr>
+        <p:spPr/>
+      </p:sp>
+      <p:sp>
+        <p:nvSpPr>
+          <p:cNvPr id="3" name="Notes Placeholder 2"/>
+          <p:cNvSpPr>
+            <a:spLocks noGrp="1"/>
+          </p:cNvSpPr>
+          <p:nvPr>
+            <p:ph type="body" idx="1"/>
+          </p:nvPr>
+        </p:nvSpPr>
+        <p:spPr/>
+        <p:txBody>
+          <a:bodyPr/>
+          <a:lstStyle/>
+          <a:p>
+            <a:r>
+              <a:rPr lang="en-US" dirty="0" smtClean="0"/>
               <a:t>A:</a:t>
             </a:r>
             <a:r>
@@ -1011,7 +1150,7 @@
 </p:notes>
 </file>
 
-<file path=ppt/notesSlides/notesSlide4.xml><?xml version="1.0" encoding="utf-8"?>
+<file path=ppt/notesSlides/notesSlide5.xml><?xml version="1.0" encoding="utf-8"?>
 <p:notes xmlns:a="http://schemas.openxmlformats.org/drawingml/2006/main" xmlns:r="http://schemas.openxmlformats.org/officeDocument/2006/relationships" xmlns:p="http://schemas.openxmlformats.org/presentationml/2006/main">
   <p:cSld>
     <p:spTree>
@@ -1745,7 +1884,7 @@
           <a:p>
             <a:fld id="{D5688612-FEC6-47BA-91DF-33F44ABAEDA3}" type="datetimeFigureOut">
               <a:rPr lang="en-US" smtClean="0"/>
-              <a:t>3/24/15</a:t>
+              <a:t>3/24/2015</a:t>
             </a:fld>
             <a:endParaRPr lang="en-US"/>
           </a:p>
@@ -1911,7 +2050,7 @@
   <p:timing>
     <p:tnLst>
       <p:par>
-        <p:cTn xmlns:p14="http://schemas.microsoft.com/office/powerpoint/2010/main" id="1" dur="indefinite" restart="never" nodeType="tmRoot"/>
+        <p:cTn id="1" dur="indefinite" restart="never" nodeType="tmRoot"/>
       </p:par>
     </p:tnLst>
   </p:timing>
@@ -2035,7 +2174,7 @@
           <a:p>
             <a:fld id="{D5688612-FEC6-47BA-91DF-33F44ABAEDA3}" type="datetimeFigureOut">
               <a:rPr lang="en-US" smtClean="0"/>
-              <a:t>3/24/15</a:t>
+              <a:t>3/24/2015</a:t>
             </a:fld>
             <a:endParaRPr lang="en-US"/>
           </a:p>
@@ -2339,7 +2478,7 @@
           <a:p>
             <a:fld id="{D5688612-FEC6-47BA-91DF-33F44ABAEDA3}" type="datetimeFigureOut">
               <a:rPr lang="en-US" smtClean="0"/>
-              <a:t>3/24/15</a:t>
+              <a:t>3/24/2015</a:t>
             </a:fld>
             <a:endParaRPr lang="en-US"/>
           </a:p>
@@ -2604,7 +2743,7 @@
           <a:p>
             <a:fld id="{D5688612-FEC6-47BA-91DF-33F44ABAEDA3}" type="datetimeFigureOut">
               <a:rPr lang="en-US" smtClean="0"/>
-              <a:t>3/24/15</a:t>
+              <a:t>3/24/2015</a:t>
             </a:fld>
             <a:endParaRPr lang="en-US"/>
           </a:p>
@@ -2854,7 +2993,7 @@
           <a:p>
             <a:fld id="{0D91CF6C-4A99-47F9-835F-1B74452D2D0E}" type="datetimeFigureOut">
               <a:rPr lang="en-US" smtClean="0"/>
-              <a:t>3/24/15</a:t>
+              <a:t>3/24/2015</a:t>
             </a:fld>
             <a:endParaRPr lang="en-US"/>
           </a:p>
@@ -3024,7 +3163,7 @@
           <a:p>
             <a:fld id="{D5688612-FEC6-47BA-91DF-33F44ABAEDA3}" type="datetimeFigureOut">
               <a:rPr lang="en-US" smtClean="0"/>
-              <a:t>3/24/15</a:t>
+              <a:t>3/24/2015</a:t>
             </a:fld>
             <a:endParaRPr lang="en-US"/>
           </a:p>
@@ -3270,7 +3409,7 @@
           <a:p>
             <a:fld id="{0D91CF6C-4A99-47F9-835F-1B74452D2D0E}" type="datetimeFigureOut">
               <a:rPr lang="en-US" smtClean="0"/>
-              <a:t>3/24/15</a:t>
+              <a:t>3/24/2015</a:t>
             </a:fld>
             <a:endParaRPr lang="en-US"/>
           </a:p>
@@ -3558,7 +3697,7 @@
           <a:p>
             <a:fld id="{0D91CF6C-4A99-47F9-835F-1B74452D2D0E}" type="datetimeFigureOut">
               <a:rPr lang="en-US" smtClean="0"/>
-              <a:t>3/24/15</a:t>
+              <a:t>3/24/2015</a:t>
             </a:fld>
             <a:endParaRPr lang="en-US"/>
           </a:p>
@@ -3980,7 +4119,7 @@
           <a:p>
             <a:fld id="{0D91CF6C-4A99-47F9-835F-1B74452D2D0E}" type="datetimeFigureOut">
               <a:rPr lang="en-US" smtClean="0"/>
-              <a:t>3/24/15</a:t>
+              <a:t>3/24/2015</a:t>
             </a:fld>
             <a:endParaRPr lang="en-US"/>
           </a:p>
@@ -4098,7 +4237,7 @@
           <a:p>
             <a:fld id="{D5688612-FEC6-47BA-91DF-33F44ABAEDA3}" type="datetimeFigureOut">
               <a:rPr lang="en-US" smtClean="0"/>
-              <a:t>3/24/15</a:t>
+              <a:t>3/24/2015</a:t>
             </a:fld>
             <a:endParaRPr lang="en-US"/>
           </a:p>
@@ -4193,7 +4332,7 @@
           <a:p>
             <a:fld id="{0D91CF6C-4A99-47F9-835F-1B74452D2D0E}" type="datetimeFigureOut">
               <a:rPr lang="en-US" smtClean="0"/>
-              <a:t>3/24/15</a:t>
+              <a:t>3/24/2015</a:t>
             </a:fld>
             <a:endParaRPr lang="en-US"/>
           </a:p>
@@ -4869,7 +5008,7 @@
   <p:timing>
     <p:tnLst>
       <p:par>
-        <p:cTn xmlns:p14="http://schemas.microsoft.com/office/powerpoint/2010/main" id="1" dur="indefinite" restart="never" nodeType="tmRoot"/>
+        <p:cTn id="1" dur="indefinite" restart="never" nodeType="tmRoot"/>
       </p:par>
     </p:tnLst>
   </p:timing>
@@ -5092,7 +5231,7 @@
           <a:p>
             <a:fld id="{0D91CF6C-4A99-47F9-835F-1B74452D2D0E}" type="datetimeFigureOut">
               <a:rPr lang="en-US" smtClean="0"/>
-              <a:t>3/24/15</a:t>
+              <a:t>3/24/2015</a:t>
             </a:fld>
             <a:endParaRPr lang="en-US"/>
           </a:p>
@@ -5345,7 +5484,7 @@
           <a:p>
             <a:fld id="{0D91CF6C-4A99-47F9-835F-1B74452D2D0E}" type="datetimeFigureOut">
               <a:rPr lang="en-US" smtClean="0"/>
-              <a:t>3/24/15</a:t>
+              <a:t>3/24/2015</a:t>
             </a:fld>
             <a:endParaRPr lang="en-US"/>
           </a:p>
@@ -5515,7 +5654,7 @@
           <a:p>
             <a:fld id="{0D91CF6C-4A99-47F9-835F-1B74452D2D0E}" type="datetimeFigureOut">
               <a:rPr lang="en-US" smtClean="0"/>
-              <a:t>3/24/15</a:t>
+              <a:t>3/24/2015</a:t>
             </a:fld>
             <a:endParaRPr lang="en-US"/>
           </a:p>
@@ -5695,7 +5834,7 @@
           <a:p>
             <a:fld id="{0D91CF6C-4A99-47F9-835F-1B74452D2D0E}" type="datetimeFigureOut">
               <a:rPr lang="en-US" smtClean="0"/>
-              <a:t>3/24/15</a:t>
+              <a:t>3/24/2015</a:t>
             </a:fld>
             <a:endParaRPr lang="en-US"/>
           </a:p>
@@ -5991,7 +6130,7 @@
   <p:timing>
     <p:tnLst>
       <p:par>
-        <p:cTn xmlns:p14="http://schemas.microsoft.com/office/powerpoint/2010/main" id="1" dur="indefinite" restart="never" nodeType="tmRoot"/>
+        <p:cTn id="1" dur="indefinite" restart="never" nodeType="tmRoot"/>
       </p:par>
     </p:tnLst>
   </p:timing>
@@ -6291,7 +6430,7 @@
   <p:timing>
     <p:tnLst>
       <p:par>
-        <p:cTn xmlns:p14="http://schemas.microsoft.com/office/powerpoint/2010/main" id="1" dur="indefinite" restart="never" nodeType="tmRoot"/>
+        <p:cTn id="1" dur="indefinite" restart="never" nodeType="tmRoot"/>
       </p:par>
     </p:tnLst>
   </p:timing>
@@ -6650,7 +6789,7 @@
   <p:timing>
     <p:tnLst>
       <p:par>
-        <p:cTn xmlns:p14="http://schemas.microsoft.com/office/powerpoint/2010/main" id="1" dur="indefinite" restart="never" nodeType="tmRoot"/>
+        <p:cTn id="1" dur="indefinite" restart="never" nodeType="tmRoot"/>
       </p:par>
     </p:tnLst>
   </p:timing>
@@ -7154,7 +7293,7 @@
   <p:timing>
     <p:tnLst>
       <p:par>
-        <p:cTn xmlns:p14="http://schemas.microsoft.com/office/powerpoint/2010/main" id="1" dur="indefinite" restart="never" nodeType="tmRoot"/>
+        <p:cTn id="1" dur="indefinite" restart="never" nodeType="tmRoot"/>
       </p:par>
     </p:tnLst>
   </p:timing>
@@ -7339,7 +7478,7 @@
   <p:timing>
     <p:tnLst>
       <p:par>
-        <p:cTn xmlns:p14="http://schemas.microsoft.com/office/powerpoint/2010/main" id="1" dur="indefinite" restart="never" nodeType="tmRoot"/>
+        <p:cTn id="1" dur="indefinite" restart="never" nodeType="tmRoot"/>
       </p:par>
     </p:tnLst>
   </p:timing>
@@ -7456,7 +7595,7 @@
   <p:timing>
     <p:tnLst>
       <p:par>
-        <p:cTn xmlns:p14="http://schemas.microsoft.com/office/powerpoint/2010/main" id="1" dur="indefinite" restart="never" nodeType="tmRoot"/>
+        <p:cTn id="1" dur="indefinite" restart="never" nodeType="tmRoot"/>
       </p:par>
     </p:tnLst>
   </p:timing>
@@ -7528,7 +7667,7 @@
           <a:p>
             <a:fld id="{D5688612-FEC6-47BA-91DF-33F44ABAEDA3}" type="datetimeFigureOut">
               <a:rPr lang="en-US" smtClean="0"/>
-              <a:t>3/24/15</a:t>
+              <a:t>3/24/2015</a:t>
             </a:fld>
             <a:endParaRPr lang="en-US"/>
           </a:p>
@@ -7904,7 +8043,7 @@
   <p:timing>
     <p:tnLst>
       <p:par>
-        <p:cTn xmlns:p14="http://schemas.microsoft.com/office/powerpoint/2010/main" id="1" dur="indefinite" restart="never" nodeType="tmRoot"/>
+        <p:cTn id="1" dur="indefinite" restart="never" nodeType="tmRoot"/>
       </p:par>
     </p:tnLst>
   </p:timing>
@@ -8313,7 +8452,7 @@
           <a:p>
             <a:fld id="{0D91CF6C-4A99-47F9-835F-1B74452D2D0E}" type="datetimeFigureOut">
               <a:rPr lang="en-US" smtClean="0"/>
-              <a:t>3/24/15</a:t>
+              <a:t>3/24/2015</a:t>
             </a:fld>
             <a:endParaRPr lang="en-US"/>
           </a:p>
@@ -8796,7 +8935,7 @@
   <p:timing>
     <p:tnLst>
       <p:par>
-        <p:cTn xmlns:p14="http://schemas.microsoft.com/office/powerpoint/2010/main" id="1" dur="indefinite" restart="never" nodeType="tmRoot"/>
+        <p:cTn id="1" dur="indefinite" restart="never" nodeType="tmRoot"/>
       </p:par>
     </p:tnLst>
   </p:timing>
@@ -9051,7 +9190,7 @@
   <p:timing>
     <p:tnLst>
       <p:par>
-        <p:cTn xmlns:p14="http://schemas.microsoft.com/office/powerpoint/2010/main" id="1" dur="indefinite" restart="never" nodeType="tmRoot"/>
+        <p:cTn id="1" dur="indefinite" restart="never" nodeType="tmRoot"/>
       </p:par>
     </p:tnLst>
   </p:timing>
@@ -9326,7 +9465,7 @@
   <p:timing>
     <p:tnLst>
       <p:par>
-        <p:cTn xmlns:p14="http://schemas.microsoft.com/office/powerpoint/2010/main" id="1" dur="indefinite" restart="never" nodeType="tmRoot"/>
+        <p:cTn id="1" dur="indefinite" restart="never" nodeType="tmRoot"/>
       </p:par>
     </p:tnLst>
   </p:timing>
@@ -9567,7 +9706,7 @@
   <p:timing>
     <p:tnLst>
       <p:par>
-        <p:cTn xmlns:p14="http://schemas.microsoft.com/office/powerpoint/2010/main" id="1" dur="indefinite" restart="never" nodeType="tmRoot"/>
+        <p:cTn id="1" dur="indefinite" restart="never" nodeType="tmRoot"/>
       </p:par>
     </p:tnLst>
   </p:timing>
@@ -9591,184 +9730,34 @@
           <a:chExt cx="0" cy="0"/>
         </a:xfrm>
       </p:grpSpPr>
-      <p:sp>
-        <p:nvSpPr>
-          <p:cNvPr id="5" name="Rectangle 4"/>
-          <p:cNvSpPr/>
+      <p:pic>
+        <p:nvPicPr>
+          <p:cNvPr id="3" name="Picture 2"/>
+          <p:cNvPicPr>
+            <a:picLocks noChangeAspect="1"/>
+          </p:cNvPicPr>
           <p:nvPr/>
-        </p:nvSpPr>
+        </p:nvPicPr>
+        <p:blipFill>
+          <a:blip r:embed="rId3"/>
+          <a:stretch>
+            <a:fillRect/>
+          </a:stretch>
+        </p:blipFill>
         <p:spPr>
           <a:xfrm>
-            <a:off x="2362200" y="762000"/>
-            <a:ext cx="4419600" cy="3429000"/>
+            <a:off x="-1" y="457200"/>
+            <a:ext cx="9148375" cy="5486400"/>
           </a:xfrm>
           <a:prstGeom prst="rect">
             <a:avLst/>
           </a:prstGeom>
-          <a:solidFill>
-            <a:schemeClr val="tx2">
-              <a:lumMod val="40000"/>
-              <a:lumOff val="60000"/>
-            </a:schemeClr>
-          </a:solidFill>
         </p:spPr>
-        <p:style>
-          <a:lnRef idx="1">
-            <a:schemeClr val="accent1"/>
-          </a:lnRef>
-          <a:fillRef idx="3">
-            <a:schemeClr val="accent1"/>
-          </a:fillRef>
-          <a:effectRef idx="2">
-            <a:schemeClr val="accent1"/>
-          </a:effectRef>
-          <a:fontRef idx="minor">
-            <a:schemeClr val="lt1"/>
-          </a:fontRef>
-        </p:style>
-        <p:txBody>
-          <a:bodyPr rtlCol="0" anchor="ctr"/>
-          <a:lstStyle/>
-          <a:p>
-            <a:pPr algn="ctr"/>
-            <a:r>
-              <a:rPr lang="en-US" dirty="0" smtClean="0">
-                <a:solidFill>
-                  <a:srgbClr val="C00000"/>
-                </a:solidFill>
-              </a:rPr>
-              <a:t>Insert your rapid prototype slides (M4)</a:t>
-            </a:r>
-          </a:p>
-          <a:p>
-            <a:pPr algn="ctr"/>
-            <a:endParaRPr lang="en-US" dirty="0" smtClean="0">
-              <a:solidFill>
-                <a:srgbClr val="C00000"/>
-              </a:solidFill>
-            </a:endParaRPr>
-          </a:p>
-          <a:p>
-            <a:pPr algn="ctr"/>
-            <a:r>
-              <a:rPr lang="en-US" dirty="0" smtClean="0">
-                <a:solidFill>
-                  <a:srgbClr val="FFFF00"/>
-                </a:solidFill>
-              </a:rPr>
-              <a:t>Use </a:t>
-            </a:r>
-            <a:r>
-              <a:rPr lang="en-US" dirty="0">
-                <a:solidFill>
-                  <a:srgbClr val="FFFF00"/>
-                </a:solidFill>
-              </a:rPr>
-              <a:t>paste option “use source formatting” to make sure slide formatting carries over</a:t>
-            </a:r>
-            <a:endParaRPr lang="en-US" dirty="0" smtClean="0">
-              <a:solidFill>
-                <a:srgbClr val="FFFF00"/>
-              </a:solidFill>
-            </a:endParaRPr>
-          </a:p>
-          <a:p>
-            <a:pPr algn="ctr"/>
-            <a:endParaRPr lang="en-US" dirty="0">
-              <a:solidFill>
-                <a:srgbClr val="C00000"/>
-              </a:solidFill>
-            </a:endParaRPr>
-          </a:p>
-          <a:p>
-            <a:pPr algn="ctr"/>
-            <a:r>
-              <a:rPr lang="en-US" dirty="0" smtClean="0">
-                <a:solidFill>
-                  <a:srgbClr val="C00000"/>
-                </a:solidFill>
-              </a:rPr>
-              <a:t>NOTE: Be sure to test </a:t>
-            </a:r>
-            <a:r>
-              <a:rPr lang="en-US" dirty="0" smtClean="0">
-                <a:solidFill>
-                  <a:srgbClr val="FFFF00"/>
-                </a:solidFill>
-              </a:rPr>
-              <a:t>slides</a:t>
-            </a:r>
-            <a:r>
-              <a:rPr lang="en-US" dirty="0" smtClean="0">
-                <a:solidFill>
-                  <a:srgbClr val="C00000"/>
-                </a:solidFill>
-              </a:rPr>
-              <a:t> once copied, to ensure that no hyperlinks broke in the transfer</a:t>
-            </a:r>
-          </a:p>
-          <a:p>
-            <a:pPr algn="ctr"/>
-            <a:endParaRPr lang="en-US" dirty="0">
-              <a:solidFill>
-                <a:srgbClr val="C00000"/>
-              </a:solidFill>
-            </a:endParaRPr>
-          </a:p>
-          <a:p>
-            <a:pPr algn="ctr"/>
-            <a:r>
-              <a:rPr lang="en-US" dirty="0" smtClean="0">
-                <a:solidFill>
-                  <a:srgbClr val="FFFF00"/>
-                </a:solidFill>
-              </a:rPr>
-              <a:t>Each teammate should </a:t>
-            </a:r>
-            <a:r>
-              <a:rPr lang="en-US" dirty="0" smtClean="0">
-                <a:solidFill>
-                  <a:srgbClr val="C00000"/>
-                </a:solidFill>
-              </a:rPr>
-              <a:t>spend 1 minute walking us through </a:t>
-            </a:r>
-            <a:r>
-              <a:rPr lang="en-US" dirty="0" smtClean="0">
-                <a:solidFill>
-                  <a:srgbClr val="FFFF00"/>
-                </a:solidFill>
-              </a:rPr>
-              <a:t>his/her</a:t>
-            </a:r>
-            <a:r>
-              <a:rPr lang="en-US" dirty="0" smtClean="0">
-                <a:solidFill>
-                  <a:srgbClr val="C00000"/>
-                </a:solidFill>
-              </a:rPr>
-              <a:t> </a:t>
-            </a:r>
-            <a:r>
-              <a:rPr lang="en-US" dirty="0" smtClean="0">
-                <a:solidFill>
-                  <a:srgbClr val="FFFF00"/>
-                </a:solidFill>
-              </a:rPr>
-              <a:t>GUI for a total of 4 minutes per team!</a:t>
-            </a:r>
-            <a:endParaRPr lang="en-US" dirty="0">
-              <a:solidFill>
-                <a:srgbClr val="FFFF00"/>
-              </a:solidFill>
-            </a:endParaRPr>
-          </a:p>
-        </p:txBody>
-      </p:sp>
+      </p:pic>
     </p:spTree>
     <p:extLst>
       <p:ext uri="{BB962C8B-B14F-4D97-AF65-F5344CB8AC3E}">
-        <p14:creationId xmlns:p14="http://schemas.microsoft.com/office/powerpoint/2010/main" val="1049481869"/>
+        <p14:creationId xmlns:p14="http://schemas.microsoft.com/office/powerpoint/2010/main" val="458793385"/>
       </p:ext>
     </p:extLst>
   </p:cSld>
@@ -9778,7 +9767,7 @@
   <p:timing>
     <p:tnLst>
       <p:par>
-        <p:cTn xmlns:p14="http://schemas.microsoft.com/office/powerpoint/2010/main" id="1" dur="indefinite" restart="never" nodeType="tmRoot"/>
+        <p:cTn id="1" dur="indefinite" restart="never" nodeType="tmRoot"/>
       </p:par>
     </p:tnLst>
   </p:timing>
@@ -10019,7 +10008,7 @@
   <p:timing>
     <p:tnLst>
       <p:par>
-        <p:cTn xmlns:p14="http://schemas.microsoft.com/office/powerpoint/2010/main" id="1" dur="indefinite" restart="never" nodeType="tmRoot"/>
+        <p:cTn id="1" dur="indefinite" restart="never" nodeType="tmRoot"/>
       </p:par>
     </p:tnLst>
   </p:timing>
@@ -10269,7 +10258,7 @@
           <a:graphicData uri="http://schemas.openxmlformats.org/presentationml/2006/ole">
             <mc:AlternateContent xmlns:mc="http://schemas.openxmlformats.org/markup-compatibility/2006">
               <mc:Choice xmlns:v="urn:schemas-microsoft-com:vml" Requires="v">
-                <p:oleObj spid="_x0000_s1033" name="Equation" r:id="rId5" imgW="114300" imgH="165100" progId="Equation.3">
+                <p:oleObj spid="_x0000_s1034" name="Equation" r:id="rId5" imgW="114300" imgH="165100" progId="Equation.3">
                   <p:embed/>
                 </p:oleObj>
               </mc:Choice>
@@ -10317,7 +10306,7 @@
   <p:timing>
     <p:tnLst>
       <p:par>
-        <p:cTn xmlns:p14="http://schemas.microsoft.com/office/powerpoint/2010/main" id="1" dur="indefinite" restart="never" nodeType="tmRoot"/>
+        <p:cTn id="1" dur="indefinite" restart="never" nodeType="tmRoot"/>
       </p:par>
     </p:tnLst>
   </p:timing>
@@ -10430,7 +10419,7 @@
   <p:timing>
     <p:tnLst>
       <p:par>
-        <p:cTn xmlns:p14="http://schemas.microsoft.com/office/powerpoint/2010/main" id="1" dur="indefinite" restart="never" nodeType="tmRoot"/>
+        <p:cTn id="1" dur="indefinite" restart="never" nodeType="tmRoot"/>
       </p:par>
     </p:tnLst>
   </p:timing>

</xml_diff>